<commit_message>
updated final project example.
</commit_message>
<xml_diff>
--- a/final/Example Final Project- Discord Bot.pptx
+++ b/final/Example Final Project- Discord Bot.pptx
@@ -664,7 +664,7 @@
           <a:p>
             <a:fld id="{11EAACC7-3B3F-47D1-959A-EF58926E955E}" type="datetimeFigureOut">
               <a:rPr lang="en-US" smtClean="0"/>
-              <a:t>8/30/2024</a:t>
+              <a:t>9/3/2024</a:t>
             </a:fld>
             <a:endParaRPr lang="en-US"/>
           </a:p>
@@ -862,7 +862,7 @@
           <a:p>
             <a:fld id="{11EAACC7-3B3F-47D1-959A-EF58926E955E}" type="datetimeFigureOut">
               <a:rPr lang="en-US" smtClean="0"/>
-              <a:t>8/30/2024</a:t>
+              <a:t>9/3/2024</a:t>
             </a:fld>
             <a:endParaRPr lang="en-US"/>
           </a:p>
@@ -1070,7 +1070,7 @@
           <a:p>
             <a:fld id="{11EAACC7-3B3F-47D1-959A-EF58926E955E}" type="datetimeFigureOut">
               <a:rPr lang="en-US" smtClean="0"/>
-              <a:t>8/30/2024</a:t>
+              <a:t>9/3/2024</a:t>
             </a:fld>
             <a:endParaRPr lang="en-US"/>
           </a:p>
@@ -1299,7 +1299,7 @@
           <a:p>
             <a:fld id="{11EAACC7-3B3F-47D1-959A-EF58926E955E}" type="datetimeFigureOut">
               <a:rPr lang="en-US" smtClean="0"/>
-              <a:t>8/30/2024</a:t>
+              <a:t>9/3/2024</a:t>
             </a:fld>
             <a:endParaRPr lang="en-US" dirty="0"/>
           </a:p>
@@ -1574,7 +1574,7 @@
           <a:p>
             <a:fld id="{11EAACC7-3B3F-47D1-959A-EF58926E955E}" type="datetimeFigureOut">
               <a:rPr lang="en-US" smtClean="0"/>
-              <a:t>8/30/2024</a:t>
+              <a:t>9/3/2024</a:t>
             </a:fld>
             <a:endParaRPr lang="en-US"/>
           </a:p>
@@ -1840,7 +1840,7 @@
           <a:p>
             <a:fld id="{11EAACC7-3B3F-47D1-959A-EF58926E955E}" type="datetimeFigureOut">
               <a:rPr lang="en-US" smtClean="0"/>
-              <a:t>8/30/2024</a:t>
+              <a:t>9/3/2024</a:t>
             </a:fld>
             <a:endParaRPr lang="en-US"/>
           </a:p>
@@ -2257,7 +2257,7 @@
           <a:p>
             <a:fld id="{11EAACC7-3B3F-47D1-959A-EF58926E955E}" type="datetimeFigureOut">
               <a:rPr lang="en-US" smtClean="0"/>
-              <a:t>8/30/2024</a:t>
+              <a:t>9/3/2024</a:t>
             </a:fld>
             <a:endParaRPr lang="en-US"/>
           </a:p>
@@ -2398,7 +2398,7 @@
           <a:p>
             <a:fld id="{11EAACC7-3B3F-47D1-959A-EF58926E955E}" type="datetimeFigureOut">
               <a:rPr lang="en-US" smtClean="0"/>
-              <a:t>8/30/2024</a:t>
+              <a:t>9/3/2024</a:t>
             </a:fld>
             <a:endParaRPr lang="en-US"/>
           </a:p>
@@ -2511,7 +2511,7 @@
           <a:p>
             <a:fld id="{11EAACC7-3B3F-47D1-959A-EF58926E955E}" type="datetimeFigureOut">
               <a:rPr lang="en-US" smtClean="0"/>
-              <a:t>8/30/2024</a:t>
+              <a:t>9/3/2024</a:t>
             </a:fld>
             <a:endParaRPr lang="en-US"/>
           </a:p>
@@ -2822,7 +2822,7 @@
           <a:p>
             <a:fld id="{11EAACC7-3B3F-47D1-959A-EF58926E955E}" type="datetimeFigureOut">
               <a:rPr lang="en-US" smtClean="0"/>
-              <a:t>8/30/2024</a:t>
+              <a:t>9/3/2024</a:t>
             </a:fld>
             <a:endParaRPr lang="en-US"/>
           </a:p>
@@ -3113,7 +3113,7 @@
           <a:p>
             <a:fld id="{11EAACC7-3B3F-47D1-959A-EF58926E955E}" type="datetimeFigureOut">
               <a:rPr lang="en-US" smtClean="0"/>
-              <a:t>8/30/2024</a:t>
+              <a:t>9/3/2024</a:t>
             </a:fld>
             <a:endParaRPr lang="en-US"/>
           </a:p>
@@ -3670,7 +3670,7 @@
           <a:p>
             <a:fld id="{11EAACC7-3B3F-47D1-959A-EF58926E955E}" type="datetimeFigureOut">
               <a:rPr lang="en-US" smtClean="0"/>
-              <a:t>8/30/2024</a:t>
+              <a:t>9/3/2024</a:t>
             </a:fld>
             <a:endParaRPr lang="en-US"/>
           </a:p>
@@ -5960,6 +5960,20 @@
               <a:t>(It’s okay to ask for ideas from your classmates during your presentation. The finished project is the one you submit. This is just meant to be an overview of the technologies involved)</a:t>
             </a:r>
           </a:p>
+          <a:p>
+            <a:endParaRPr lang="en-US" dirty="0"/>
+          </a:p>
+          <a:p>
+            <a:r>
+              <a:rPr lang="en-US" dirty="0"/>
+              <a:t>Cloud </a:t>
+            </a:r>
+            <a:r>
+              <a:rPr lang="en-US"/>
+              <a:t>host suggestions?</a:t>
+            </a:r>
+            <a:endParaRPr lang="en-US" dirty="0"/>
+          </a:p>
         </p:txBody>
       </p:sp>
     </p:spTree>

</xml_diff>